<commit_message>
Test to see if change in powerpoint file triggers git changes
</commit_message>
<xml_diff>
--- a/GIT.pptx
+++ b/GIT.pptx
@@ -4074,15 +4074,7 @@
             </a:r>
             <a:r>
               <a:rPr lang="en-CA" sz="1800" dirty="0" smtClean="0"/>
-              <a:t>ill tell you that your local repository is ahead of </a:t>
-            </a:r>
-            <a:r>
-              <a:rPr lang="en-CA" sz="1800" dirty="0" smtClean="0"/>
-              <a:t>origin/master </a:t>
-            </a:r>
-            <a:r>
-              <a:rPr lang="en-CA" sz="1800" dirty="0" smtClean="0"/>
-              <a:t>by 1 commit:</a:t>
+              <a:t>ill tell you that your local repository is ahead of origin/master by 1 commit:</a:t>
             </a:r>
           </a:p>
           <a:p>
@@ -4215,13 +4207,8 @@
             </a:pPr>
             <a:r>
               <a:rPr lang="en-CA" sz="1800" dirty="0" smtClean="0"/>
-              <a:t>Now to remove the test.txt </a:t>
-            </a:r>
-            <a:r>
-              <a:rPr lang="en-CA" sz="1800" dirty="0" smtClean="0"/>
-              <a:t>file</a:t>
-            </a:r>
-            <a:endParaRPr lang="en-CA" sz="1800" dirty="0" smtClean="0"/>
+              <a:t>Now to remove the test.txt file</a:t>
+            </a:r>
           </a:p>
           <a:p>
             <a:pPr marL="0" indent="0">
@@ -4355,11 +4342,7 @@
             </a:pPr>
             <a:r>
               <a:rPr lang="en-CA" sz="1800" dirty="0" smtClean="0"/>
-              <a:t>Will update the remote repository on GitHub. Look at the webpage to confirm this. The file test.txt should be gone</a:t>
-            </a:r>
-            <a:r>
-              <a:rPr lang="en-CA" sz="1800" dirty="0" smtClean="0"/>
-              <a:t>.</a:t>
+              <a:t>Will update the remote repository on GitHub. Look at the webpage to confirm this. The file test.txt should be gone.</a:t>
             </a:r>
             <a:endParaRPr lang="en-CA" sz="1800" dirty="0"/>
           </a:p>
@@ -6309,7 +6292,19 @@
             </a:pPr>
             <a:r>
               <a:rPr lang="en-CA" dirty="0" smtClean="0"/>
-              <a:t>If you are making copies of projects and renaming them so that you can make</a:t>
+              <a:t>If you are </a:t>
+            </a:r>
+            <a:r>
+              <a:rPr lang="en-CA" smtClean="0"/>
+              <a:t>making </a:t>
+            </a:r>
+            <a:r>
+              <a:rPr lang="en-CA" smtClean="0"/>
+              <a:t>copies </a:t>
+            </a:r>
+            <a:r>
+              <a:rPr lang="en-CA" dirty="0" smtClean="0"/>
+              <a:t>of projects and renaming them so that you can make</a:t>
             </a:r>
             <a:br>
               <a:rPr lang="en-CA" dirty="0" smtClean="0"/>
@@ -6376,19 +6371,7 @@
             </a:pPr>
             <a:r>
               <a:rPr lang="en-CA" dirty="0" smtClean="0"/>
-              <a:t>If you want to try something new (no matter how </a:t>
-            </a:r>
-            <a:r>
-              <a:rPr lang="en-CA" dirty="0" smtClean="0"/>
-              <a:t>silly</a:t>
-            </a:r>
-            <a:r>
-              <a:rPr lang="en-CA" dirty="0" smtClean="0"/>
-              <a:t>) </a:t>
-            </a:r>
-            <a:r>
-              <a:rPr lang="en-CA" dirty="0" smtClean="0"/>
-              <a:t>with your code but don’t</a:t>
+              <a:t>If you want to try something new (no matter how silly) with your code but don’t</a:t>
             </a:r>
             <a:br>
               <a:rPr lang="en-CA" dirty="0" smtClean="0"/>
@@ -6999,13 +6982,8 @@
             </a:r>
             <a:r>
               <a:rPr lang="en-CA" sz="1800" i="1" dirty="0" smtClean="0"/>
-              <a:t> </a:t>
-            </a:r>
-            <a:r>
-              <a:rPr lang="en-CA" sz="1800" i="1" dirty="0" smtClean="0"/>
-              <a:t>yours (Pull request in GitHub).</a:t>
-            </a:r>
-            <a:endParaRPr lang="en-CA" sz="1800" i="1" dirty="0" smtClean="0"/>
+              <a:t> yours (Pull request in GitHub).</a:t>
+            </a:r>
           </a:p>
           <a:p>
             <a:r>

</xml_diff>

<commit_message>
Added information on merging particular branches with remotes branches
</commit_message>
<xml_diff>
--- a/GIT.pptx
+++ b/GIT.pptx
@@ -216,7 +216,7 @@
           <a:p>
             <a:fld id="{40A27432-2B61-43FB-8D64-B81ECA60EC3E}" type="datetimeFigureOut">
               <a:rPr lang="en-CA" smtClean="0"/>
-              <a:t>17/03/2014</a:t>
+              <a:t>18/03/2014</a:t>
             </a:fld>
             <a:endParaRPr lang="en-CA"/>
           </a:p>
@@ -1318,7 +1318,7 @@
             <a:fld id="{1D8BD707-D9CF-40AE-B4C6-C98DA3205C09}" type="datetimeFigureOut">
               <a:rPr lang="en-US" smtClean="0"/>
               <a:pPr/>
-              <a:t>3/17/2014</a:t>
+              <a:t>3/18/2014</a:t>
             </a:fld>
             <a:endParaRPr lang="en-US"/>
           </a:p>
@@ -1485,7 +1485,7 @@
             <a:fld id="{1D8BD707-D9CF-40AE-B4C6-C98DA3205C09}" type="datetimeFigureOut">
               <a:rPr lang="en-US" smtClean="0"/>
               <a:pPr/>
-              <a:t>3/17/2014</a:t>
+              <a:t>3/18/2014</a:t>
             </a:fld>
             <a:endParaRPr lang="en-US"/>
           </a:p>
@@ -1662,7 +1662,7 @@
             <a:fld id="{1D8BD707-D9CF-40AE-B4C6-C98DA3205C09}" type="datetimeFigureOut">
               <a:rPr lang="en-US" smtClean="0"/>
               <a:pPr/>
-              <a:t>3/17/2014</a:t>
+              <a:t>3/18/2014</a:t>
             </a:fld>
             <a:endParaRPr lang="en-US"/>
           </a:p>
@@ -1829,7 +1829,7 @@
             <a:fld id="{1D8BD707-D9CF-40AE-B4C6-C98DA3205C09}" type="datetimeFigureOut">
               <a:rPr lang="en-US" smtClean="0"/>
               <a:pPr/>
-              <a:t>3/17/2014</a:t>
+              <a:t>3/18/2014</a:t>
             </a:fld>
             <a:endParaRPr lang="en-US"/>
           </a:p>
@@ -2072,7 +2072,7 @@
             <a:fld id="{1D8BD707-D9CF-40AE-B4C6-C98DA3205C09}" type="datetimeFigureOut">
               <a:rPr lang="en-US" smtClean="0"/>
               <a:pPr/>
-              <a:t>3/17/2014</a:t>
+              <a:t>3/18/2014</a:t>
             </a:fld>
             <a:endParaRPr lang="en-US"/>
           </a:p>
@@ -2357,7 +2357,7 @@
             <a:fld id="{1D8BD707-D9CF-40AE-B4C6-C98DA3205C09}" type="datetimeFigureOut">
               <a:rPr lang="en-US" smtClean="0"/>
               <a:pPr/>
-              <a:t>3/17/2014</a:t>
+              <a:t>3/18/2014</a:t>
             </a:fld>
             <a:endParaRPr lang="en-US"/>
           </a:p>
@@ -2776,7 +2776,7 @@
             <a:fld id="{1D8BD707-D9CF-40AE-B4C6-C98DA3205C09}" type="datetimeFigureOut">
               <a:rPr lang="en-US" smtClean="0"/>
               <a:pPr/>
-              <a:t>3/17/2014</a:t>
+              <a:t>3/18/2014</a:t>
             </a:fld>
             <a:endParaRPr lang="en-US"/>
           </a:p>
@@ -2891,7 +2891,7 @@
             <a:fld id="{1D8BD707-D9CF-40AE-B4C6-C98DA3205C09}" type="datetimeFigureOut">
               <a:rPr lang="en-US" smtClean="0"/>
               <a:pPr/>
-              <a:t>3/17/2014</a:t>
+              <a:t>3/18/2014</a:t>
             </a:fld>
             <a:endParaRPr lang="en-US"/>
           </a:p>
@@ -2983,7 +2983,7 @@
             <a:fld id="{1D8BD707-D9CF-40AE-B4C6-C98DA3205C09}" type="datetimeFigureOut">
               <a:rPr lang="en-US" smtClean="0"/>
               <a:pPr/>
-              <a:t>3/17/2014</a:t>
+              <a:t>3/18/2014</a:t>
             </a:fld>
             <a:endParaRPr lang="en-US"/>
           </a:p>
@@ -3257,7 +3257,7 @@
             <a:fld id="{1D8BD707-D9CF-40AE-B4C6-C98DA3205C09}" type="datetimeFigureOut">
               <a:rPr lang="en-US" smtClean="0"/>
               <a:pPr/>
-              <a:t>3/17/2014</a:t>
+              <a:t>3/18/2014</a:t>
             </a:fld>
             <a:endParaRPr lang="en-US"/>
           </a:p>
@@ -3507,7 +3507,7 @@
             <a:fld id="{1D8BD707-D9CF-40AE-B4C6-C98DA3205C09}" type="datetimeFigureOut">
               <a:rPr lang="en-US" smtClean="0"/>
               <a:pPr/>
-              <a:t>3/17/2014</a:t>
+              <a:t>3/18/2014</a:t>
             </a:fld>
             <a:endParaRPr lang="en-US"/>
           </a:p>
@@ -3717,7 +3717,7 @@
             <a:fld id="{1D8BD707-D9CF-40AE-B4C6-C98DA3205C09}" type="datetimeFigureOut">
               <a:rPr lang="en-US" smtClean="0"/>
               <a:pPr/>
-              <a:t>3/17/2014</a:t>
+              <a:t>3/18/2014</a:t>
             </a:fld>
             <a:endParaRPr lang="en-US"/>
           </a:p>
@@ -4601,12 +4601,12 @@
               <a:t>git </a:t>
             </a:r>
             <a:r>
-              <a:rPr lang="en-CA" sz="1800" i="1" smtClean="0">
+              <a:rPr lang="en-CA" sz="1800" i="1" dirty="0" err="1" smtClean="0">
                 <a:solidFill>
                   <a:schemeClr val="accent6"/>
                 </a:solidFill>
               </a:rPr>
-              <a:t>rm </a:t>
+              <a:t>rm</a:t>
             </a:r>
             <a:r>
               <a:rPr lang="en-CA" sz="1800" i="1" dirty="0" smtClean="0">
@@ -4614,7 +4614,7 @@
                   <a:schemeClr val="accent6"/>
                 </a:solidFill>
               </a:rPr>
-              <a:t>test.txt</a:t>
+              <a:t> test.txt</a:t>
             </a:r>
             <a:endParaRPr lang="en-CA" sz="1800" i="1" dirty="0">
               <a:solidFill>
@@ -5664,6 +5664,13 @@
   <p:clrMapOvr>
     <a:masterClrMapping/>
   </p:clrMapOvr>
+  <p:timing>
+    <p:tnLst>
+      <p:par>
+        <p:cTn id="1" dur="indefinite" restart="never" nodeType="tmRoot"/>
+      </p:par>
+    </p:tnLst>
+  </p:timing>
 </p:sld>
 </file>
 
@@ -5782,15 +5789,7 @@
             </a:pPr>
             <a:r>
               <a:rPr lang="en-CA" sz="1800" dirty="0" smtClean="0"/>
-              <a:t>Check the GitHub webpage and you will see that this did not remove the branch from your GitHub project, only your local repository. If you want to delete it from GitHub you must use </a:t>
-            </a:r>
-            <a:r>
-              <a:rPr lang="en-CA" sz="1800" smtClean="0"/>
-              <a:t>the command</a:t>
-            </a:r>
-            <a:r>
-              <a:rPr lang="en-CA" sz="1800" dirty="0" smtClean="0"/>
-              <a:t>:</a:t>
+              <a:t>Check the GitHub webpage and you will see that this did not remove the branch from your GitHub project, only your local repository. If you want to delete it from GitHub you must use the command:</a:t>
             </a:r>
           </a:p>
           <a:p>
@@ -5843,7 +5842,29 @@
             <a:pPr marL="0" indent="0">
               <a:buNone/>
             </a:pPr>
-            <a:endParaRPr lang="en-CA" sz="1800" dirty="0"/>
+            <a:r>
+              <a:rPr lang="en-CA" sz="1800" dirty="0" smtClean="0"/>
+              <a:t>To checkout a branch that exists in the origin:</a:t>
+            </a:r>
+          </a:p>
+          <a:p>
+            <a:pPr marL="0" indent="0">
+              <a:buNone/>
+            </a:pPr>
+            <a:endParaRPr lang="en-CA" sz="1800" smtClean="0"/>
+          </a:p>
+          <a:p>
+            <a:pPr marL="0" indent="0">
+              <a:buNone/>
+            </a:pPr>
+            <a:r>
+              <a:rPr lang="en-CA" sz="1800" smtClean="0"/>
+              <a:t>git </a:t>
+            </a:r>
+            <a:r>
+              <a:rPr lang="en-CA" sz="1800" dirty="0"/>
+              <a:t>checkout -b test origin/test</a:t>
+            </a:r>
           </a:p>
         </p:txBody>
       </p:sp>
@@ -5857,6 +5878,13 @@
   <p:clrMapOvr>
     <a:masterClrMapping/>
   </p:clrMapOvr>
+  <p:timing>
+    <p:tnLst>
+      <p:par>
+        <p:cTn id="1" dur="indefinite" restart="never" nodeType="tmRoot"/>
+      </p:par>
+    </p:tnLst>
+  </p:timing>
 </p:sld>
 </file>
 
@@ -6104,6 +6132,13 @@
   <p:clrMapOvr>
     <a:masterClrMapping/>
   </p:clrMapOvr>
+  <p:timing>
+    <p:tnLst>
+      <p:par>
+        <p:cTn id="1" dur="indefinite" restart="never" nodeType="tmRoot"/>
+      </p:par>
+    </p:tnLst>
+  </p:timing>
 </p:sld>
 </file>
 
@@ -6808,6 +6843,13 @@
   <p:clrMapOvr>
     <a:masterClrMapping/>
   </p:clrMapOvr>
+  <p:timing>
+    <p:tnLst>
+      <p:par>
+        <p:cTn id="1" dur="indefinite" restart="never" nodeType="tmRoot"/>
+      </p:par>
+    </p:tnLst>
+  </p:timing>
 </p:sld>
 </file>
 
@@ -7254,6 +7296,13 @@
   <p:clrMapOvr>
     <a:masterClrMapping/>
   </p:clrMapOvr>
+  <p:timing>
+    <p:tnLst>
+      <p:par>
+        <p:cTn id="1" dur="indefinite" restart="never" nodeType="tmRoot"/>
+      </p:par>
+    </p:tnLst>
+  </p:timing>
 </p:sld>
 </file>
 
@@ -7344,15 +7393,34 @@
                   <a:schemeClr val="accent6"/>
                 </a:solidFill>
               </a:rPr>
-              <a:t>add cgrandin https</a:t>
+              <a:t>add cgrandin </a:t>
+            </a:r>
+            <a:r>
+              <a:rPr lang="en-CA" sz="1800" dirty="0" smtClean="0">
+                <a:solidFill>
+                  <a:schemeClr val="accent6"/>
+                </a:solidFill>
+                <a:hlinkClick r:id="rId2"/>
+              </a:rPr>
+              <a:t>https</a:t>
             </a:r>
             <a:r>
               <a:rPr lang="en-CA" sz="1800" dirty="0">
                 <a:solidFill>
                   <a:schemeClr val="accent6"/>
                 </a:solidFill>
-              </a:rPr>
-              <a:t>://github.com/cgrandin/git-workshop </a:t>
+                <a:hlinkClick r:id="rId2"/>
+              </a:rPr>
+              <a:t>://</a:t>
+            </a:r>
+            <a:r>
+              <a:rPr lang="en-CA" sz="1800" dirty="0" smtClean="0">
+                <a:solidFill>
+                  <a:schemeClr val="accent6"/>
+                </a:solidFill>
+                <a:hlinkClick r:id="rId2"/>
+              </a:rPr>
+              <a:t>github.com/cgrandin/git-workshop</a:t>
             </a:r>
             <a:endParaRPr lang="en-CA" sz="1800" dirty="0" smtClean="0">
               <a:solidFill>
@@ -7617,6 +7685,13 @@
   <p:clrMapOvr>
     <a:masterClrMapping/>
   </p:clrMapOvr>
+  <p:timing>
+    <p:tnLst>
+      <p:par>
+        <p:cTn id="1" dur="indefinite" restart="never" nodeType="tmRoot"/>
+      </p:par>
+    </p:tnLst>
+  </p:timing>
 </p:sld>
 </file>
 
@@ -7819,6 +7894,13 @@
   <p:clrMapOvr>
     <a:masterClrMapping/>
   </p:clrMapOvr>
+  <p:timing>
+    <p:tnLst>
+      <p:par>
+        <p:cTn id="1" dur="indefinite" restart="never" nodeType="tmRoot"/>
+      </p:par>
+    </p:tnLst>
+  </p:timing>
 </p:sld>
 </file>
 
@@ -8010,6 +8092,13 @@
   <p:clrMapOvr>
     <a:masterClrMapping/>
   </p:clrMapOvr>
+  <p:timing>
+    <p:tnLst>
+      <p:par>
+        <p:cTn id="1" dur="indefinite" restart="never" nodeType="tmRoot"/>
+      </p:par>
+    </p:tnLst>
+  </p:timing>
 </p:sld>
 </file>
 
@@ -8069,6 +8158,13 @@
   <p:clrMapOvr>
     <a:masterClrMapping/>
   </p:clrMapOvr>
+  <p:timing>
+    <p:tnLst>
+      <p:par>
+        <p:cTn id="1" dur="indefinite" restart="never" nodeType="tmRoot"/>
+      </p:par>
+    </p:tnLst>
+  </p:timing>
 </p:sld>
 </file>
 

</xml_diff>

<commit_message>
Slight modifications to README and powerpoint
</commit_message>
<xml_diff>
--- a/GIT.pptx
+++ b/GIT.pptx
@@ -216,7 +216,7 @@
           <a:p>
             <a:fld id="{40A27432-2B61-43FB-8D64-B81ECA60EC3E}" type="datetimeFigureOut">
               <a:rPr lang="en-CA" smtClean="0"/>
-              <a:t>18/03/2014</a:t>
+              <a:t>11/12/2014</a:t>
             </a:fld>
             <a:endParaRPr lang="en-CA"/>
           </a:p>
@@ -612,10 +612,6 @@
           <a:bodyPr/>
           <a:lstStyle/>
           <a:p>
-            <a:r>
-              <a:rPr lang="en-CA" dirty="0" smtClean="0"/>
-              <a:t>Git was designed so that people on an unreliable link could exchange code via email, even. It is possible to work completely disconnected and burn a CD to exchange code via git.</a:t>
-            </a:r>
             <a:endParaRPr lang="en-CA" dirty="0"/>
           </a:p>
         </p:txBody>
@@ -790,19 +786,17 @@
           <a:p>
             <a:r>
               <a:rPr lang="en-CA" dirty="0" smtClean="0"/>
-              <a:t>Fetch is</a:t>
+              <a:t>The</a:t>
             </a:r>
             <a:r>
               <a:rPr lang="en-CA" baseline="0" dirty="0" smtClean="0"/>
-              <a:t> always good, it will not overwrite anything at all in your repository. Pull will change your repository by merging the current </a:t>
-            </a:r>
-            <a:r>
-              <a:rPr lang="en-CA" baseline="0" dirty="0" err="1" smtClean="0"/>
-              <a:t>Github</a:t>
-            </a:r>
+              <a:t> main thing to note is that merges and in fact all changes happen on your local machine. You push those merges/changes once completed.</a:t>
+            </a:r>
+          </a:p>
+          <a:p>
             <a:r>
               <a:rPr lang="en-CA" baseline="0" dirty="0" smtClean="0"/>
-              <a:t> repo with yours.</a:t>
+              <a:t>Also </a:t>
             </a:r>
             <a:endParaRPr lang="en-CA" dirty="0"/>
           </a:p>
@@ -825,7 +819,7 @@
           <a:p>
             <a:fld id="{8D8A9842-5A58-4815-8449-4FCBEADA5A58}" type="slidenum">
               <a:rPr lang="en-CA" smtClean="0"/>
-              <a:t>17</a:t>
+              <a:t>6</a:t>
             </a:fld>
             <a:endParaRPr lang="en-CA"/>
           </a:p>
@@ -834,7 +828,7 @@
     </p:spTree>
     <p:extLst>
       <p:ext uri="{BB962C8B-B14F-4D97-AF65-F5344CB8AC3E}">
-        <p14:creationId xmlns:p14="http://schemas.microsoft.com/office/powerpoint/2010/main" val="1077628952"/>
+        <p14:creationId xmlns:p14="http://schemas.microsoft.com/office/powerpoint/2010/main" val="566890353"/>
       </p:ext>
     </p:extLst>
   </p:cSld>
@@ -925,7 +919,7 @@
           <a:p>
             <a:fld id="{8D8A9842-5A58-4815-8449-4FCBEADA5A58}" type="slidenum">
               <a:rPr lang="en-CA" smtClean="0"/>
-              <a:t>18</a:t>
+              <a:t>17</a:t>
             </a:fld>
             <a:endParaRPr lang="en-CA"/>
           </a:p>
@@ -990,11 +984,119 @@
           <a:p>
             <a:r>
               <a:rPr lang="en-CA" dirty="0" smtClean="0"/>
+              <a:t>Fetch is</a:t>
+            </a:r>
+            <a:r>
+              <a:rPr lang="en-CA" baseline="0" dirty="0" smtClean="0"/>
+              <a:t> always good, it will not overwrite anything at all in your repository. Pull will change your repository by merging the current </a:t>
+            </a:r>
+            <a:r>
+              <a:rPr lang="en-CA" baseline="0" dirty="0" err="1" smtClean="0"/>
+              <a:t>Github</a:t>
+            </a:r>
+            <a:r>
+              <a:rPr lang="en-CA" baseline="0" dirty="0" smtClean="0"/>
+              <a:t> repo with yours.</a:t>
+            </a:r>
+            <a:endParaRPr lang="en-CA" dirty="0"/>
+          </a:p>
+        </p:txBody>
+      </p:sp>
+      <p:sp>
+        <p:nvSpPr>
+          <p:cNvPr id="4" name="Slide Number Placeholder 3"/>
+          <p:cNvSpPr>
+            <a:spLocks noGrp="1"/>
+          </p:cNvSpPr>
+          <p:nvPr>
+            <p:ph type="sldNum" sz="quarter" idx="10"/>
+          </p:nvPr>
+        </p:nvSpPr>
+        <p:spPr/>
+        <p:txBody>
+          <a:bodyPr/>
+          <a:lstStyle/>
+          <a:p>
+            <a:fld id="{8D8A9842-5A58-4815-8449-4FCBEADA5A58}" type="slidenum">
+              <a:rPr lang="en-CA" smtClean="0"/>
+              <a:t>18</a:t>
+            </a:fld>
+            <a:endParaRPr lang="en-CA"/>
+          </a:p>
+        </p:txBody>
+      </p:sp>
+    </p:spTree>
+    <p:extLst>
+      <p:ext uri="{BB962C8B-B14F-4D97-AF65-F5344CB8AC3E}">
+        <p14:creationId xmlns:p14="http://schemas.microsoft.com/office/powerpoint/2010/main" val="1077628952"/>
+      </p:ext>
+    </p:extLst>
+  </p:cSld>
+  <p:clrMapOvr>
+    <a:masterClrMapping/>
+  </p:clrMapOvr>
+</p:notes>
+</file>
+
+<file path=ppt/notesSlides/notesSlide7.xml><?xml version="1.0" encoding="utf-8"?>
+<p:notes xmlns:a="http://schemas.openxmlformats.org/drawingml/2006/main" xmlns:r="http://schemas.openxmlformats.org/officeDocument/2006/relationships" xmlns:p="http://schemas.openxmlformats.org/presentationml/2006/main">
+  <p:cSld>
+    <p:spTree>
+      <p:nvGrpSpPr>
+        <p:cNvPr id="1" name=""/>
+        <p:cNvGrpSpPr/>
+        <p:nvPr/>
+      </p:nvGrpSpPr>
+      <p:grpSpPr>
+        <a:xfrm>
+          <a:off x="0" y="0"/>
+          <a:ext cx="0" cy="0"/>
+          <a:chOff x="0" y="0"/>
+          <a:chExt cx="0" cy="0"/>
+        </a:xfrm>
+      </p:grpSpPr>
+      <p:sp>
+        <p:nvSpPr>
+          <p:cNvPr id="2" name="Slide Image Placeholder 1"/>
+          <p:cNvSpPr>
+            <a:spLocks noGrp="1" noRot="1" noChangeAspect="1"/>
+          </p:cNvSpPr>
+          <p:nvPr>
+            <p:ph type="sldImg"/>
+          </p:nvPr>
+        </p:nvSpPr>
+        <p:spPr/>
+      </p:sp>
+      <p:sp>
+        <p:nvSpPr>
+          <p:cNvPr id="3" name="Notes Placeholder 2"/>
+          <p:cNvSpPr>
+            <a:spLocks noGrp="1"/>
+          </p:cNvSpPr>
+          <p:nvPr>
+            <p:ph type="body" idx="1"/>
+          </p:nvPr>
+        </p:nvSpPr>
+        <p:spPr/>
+        <p:txBody>
+          <a:bodyPr/>
+          <a:lstStyle/>
+          <a:p>
+            <a:r>
+              <a:rPr lang="en-CA" dirty="0" smtClean="0"/>
               <a:t>Merge</a:t>
             </a:r>
             <a:r>
               <a:rPr lang="en-CA" baseline="0" dirty="0" smtClean="0"/>
-              <a:t> does a three-way merge between the branch you are in, the branch you send to the call, and their common ancestor.</a:t>
+              <a:t> does a three-way merge between the branch you are in, the branch you send to the call, and their common ancestor</a:t>
+            </a:r>
+            <a:r>
+              <a:rPr lang="en-CA" baseline="0" dirty="0" smtClean="0"/>
+              <a:t>. HEAD is which commit </a:t>
+            </a:r>
+            <a:r>
+              <a:rPr lang="en-CA" baseline="0" smtClean="0"/>
+              <a:t>is currently pointed at.</a:t>
             </a:r>
             <a:endParaRPr lang="en-CA" dirty="0"/>
           </a:p>
@@ -1036,7 +1138,7 @@
 </p:notes>
 </file>
 
-<file path=ppt/notesSlides/notesSlide7.xml><?xml version="1.0" encoding="utf-8"?>
+<file path=ppt/notesSlides/notesSlide8.xml><?xml version="1.0" encoding="utf-8"?>
 <p:notes xmlns:a="http://schemas.openxmlformats.org/drawingml/2006/main" xmlns:r="http://schemas.openxmlformats.org/officeDocument/2006/relationships" xmlns:p="http://schemas.openxmlformats.org/presentationml/2006/main">
   <p:cSld>
     <p:spTree>
@@ -1318,7 +1420,7 @@
             <a:fld id="{1D8BD707-D9CF-40AE-B4C6-C98DA3205C09}" type="datetimeFigureOut">
               <a:rPr lang="en-US" smtClean="0"/>
               <a:pPr/>
-              <a:t>3/18/2014</a:t>
+              <a:t>12/11/2014</a:t>
             </a:fld>
             <a:endParaRPr lang="en-US"/>
           </a:p>
@@ -1485,7 +1587,7 @@
             <a:fld id="{1D8BD707-D9CF-40AE-B4C6-C98DA3205C09}" type="datetimeFigureOut">
               <a:rPr lang="en-US" smtClean="0"/>
               <a:pPr/>
-              <a:t>3/18/2014</a:t>
+              <a:t>12/11/2014</a:t>
             </a:fld>
             <a:endParaRPr lang="en-US"/>
           </a:p>
@@ -1662,7 +1764,7 @@
             <a:fld id="{1D8BD707-D9CF-40AE-B4C6-C98DA3205C09}" type="datetimeFigureOut">
               <a:rPr lang="en-US" smtClean="0"/>
               <a:pPr/>
-              <a:t>3/18/2014</a:t>
+              <a:t>12/11/2014</a:t>
             </a:fld>
             <a:endParaRPr lang="en-US"/>
           </a:p>
@@ -1829,7 +1931,7 @@
             <a:fld id="{1D8BD707-D9CF-40AE-B4C6-C98DA3205C09}" type="datetimeFigureOut">
               <a:rPr lang="en-US" smtClean="0"/>
               <a:pPr/>
-              <a:t>3/18/2014</a:t>
+              <a:t>12/11/2014</a:t>
             </a:fld>
             <a:endParaRPr lang="en-US"/>
           </a:p>
@@ -2072,7 +2174,7 @@
             <a:fld id="{1D8BD707-D9CF-40AE-B4C6-C98DA3205C09}" type="datetimeFigureOut">
               <a:rPr lang="en-US" smtClean="0"/>
               <a:pPr/>
-              <a:t>3/18/2014</a:t>
+              <a:t>12/11/2014</a:t>
             </a:fld>
             <a:endParaRPr lang="en-US"/>
           </a:p>
@@ -2357,7 +2459,7 @@
             <a:fld id="{1D8BD707-D9CF-40AE-B4C6-C98DA3205C09}" type="datetimeFigureOut">
               <a:rPr lang="en-US" smtClean="0"/>
               <a:pPr/>
-              <a:t>3/18/2014</a:t>
+              <a:t>12/11/2014</a:t>
             </a:fld>
             <a:endParaRPr lang="en-US"/>
           </a:p>
@@ -2776,7 +2878,7 @@
             <a:fld id="{1D8BD707-D9CF-40AE-B4C6-C98DA3205C09}" type="datetimeFigureOut">
               <a:rPr lang="en-US" smtClean="0"/>
               <a:pPr/>
-              <a:t>3/18/2014</a:t>
+              <a:t>12/11/2014</a:t>
             </a:fld>
             <a:endParaRPr lang="en-US"/>
           </a:p>
@@ -2891,7 +2993,7 @@
             <a:fld id="{1D8BD707-D9CF-40AE-B4C6-C98DA3205C09}" type="datetimeFigureOut">
               <a:rPr lang="en-US" smtClean="0"/>
               <a:pPr/>
-              <a:t>3/18/2014</a:t>
+              <a:t>12/11/2014</a:t>
             </a:fld>
             <a:endParaRPr lang="en-US"/>
           </a:p>
@@ -2983,7 +3085,7 @@
             <a:fld id="{1D8BD707-D9CF-40AE-B4C6-C98DA3205C09}" type="datetimeFigureOut">
               <a:rPr lang="en-US" smtClean="0"/>
               <a:pPr/>
-              <a:t>3/18/2014</a:t>
+              <a:t>12/11/2014</a:t>
             </a:fld>
             <a:endParaRPr lang="en-US"/>
           </a:p>
@@ -3257,7 +3359,7 @@
             <a:fld id="{1D8BD707-D9CF-40AE-B4C6-C98DA3205C09}" type="datetimeFigureOut">
               <a:rPr lang="en-US" smtClean="0"/>
               <a:pPr/>
-              <a:t>3/18/2014</a:t>
+              <a:t>12/11/2014</a:t>
             </a:fld>
             <a:endParaRPr lang="en-US"/>
           </a:p>
@@ -3507,7 +3609,7 @@
             <a:fld id="{1D8BD707-D9CF-40AE-B4C6-C98DA3205C09}" type="datetimeFigureOut">
               <a:rPr lang="en-US" smtClean="0"/>
               <a:pPr/>
-              <a:t>3/18/2014</a:t>
+              <a:t>12/11/2014</a:t>
             </a:fld>
             <a:endParaRPr lang="en-US"/>
           </a:p>
@@ -3717,7 +3819,7 @@
             <a:fld id="{1D8BD707-D9CF-40AE-B4C6-C98DA3205C09}" type="datetimeFigureOut">
               <a:rPr lang="en-US" smtClean="0"/>
               <a:pPr/>
-              <a:t>3/18/2014</a:t>
+              <a:t>12/11/2014</a:t>
             </a:fld>
             <a:endParaRPr lang="en-US"/>
           </a:p>
@@ -8987,7 +9089,7 @@
           </p:nvPr>
         </p:nvPicPr>
         <p:blipFill>
-          <a:blip r:embed="rId2">
+          <a:blip r:embed="rId3">
             <a:extLst>
               <a:ext uri="{28A0092B-C50C-407E-A947-70E740481C1C}">
                 <a14:useLocalDpi xmlns:a14="http://schemas.microsoft.com/office/drawing/2010/main" val="0"/>
@@ -9761,8 +9863,13 @@
             </a:r>
             <a:r>
               <a:rPr lang="en-CA" sz="1800" dirty="0" smtClean="0"/>
-              <a:t> from.</a:t>
-            </a:r>
+              <a:t> </a:t>
+            </a:r>
+            <a:r>
+              <a:rPr lang="en-CA" sz="1800" dirty="0" smtClean="0"/>
+              <a:t>from or added after.</a:t>
+            </a:r>
+            <a:endParaRPr lang="en-CA" sz="1800" dirty="0" smtClean="0"/>
           </a:p>
           <a:p>
             <a:pPr marL="0" indent="0">

</xml_diff>